<commit_message>
use a custom image, prep the second part, adjust resource names
</commit_message>
<xml_diff>
--- a/Intro slide.pptx
+++ b/Intro slide.pptx
@@ -8,7 +8,8 @@
     <p:sldId id="256" r:id="rId2"/>
     <p:sldId id="257" r:id="rId3"/>
     <p:sldId id="258" r:id="rId4"/>
-    <p:sldId id="259" r:id="rId5"/>
+    <p:sldId id="260" r:id="rId5"/>
+    <p:sldId id="259" r:id="rId6"/>
   </p:sldIdLst>
   <p:sldSz cx="12192000" cy="6858000"/>
   <p:notesSz cx="6858000" cy="9144000"/>
@@ -4391,7 +4392,7 @@
           <a:p>
             <a:fld id="{48A87A34-81AB-432B-8DAE-1953F412C126}" type="datetimeFigureOut">
               <a:rPr lang="en-US" dirty="0"/>
-              <a:t>2/25/24</a:t>
+              <a:t>3/8/24</a:t>
             </a:fld>
             <a:endParaRPr lang="en-US" dirty="0"/>
           </a:p>
@@ -4653,7 +4654,7 @@
           <a:p>
             <a:fld id="{48A87A34-81AB-432B-8DAE-1953F412C126}" type="datetimeFigureOut">
               <a:rPr lang="en-US" dirty="0"/>
-              <a:t>2/25/24</a:t>
+              <a:t>3/8/24</a:t>
             </a:fld>
             <a:endParaRPr lang="en-US" dirty="0"/>
           </a:p>
@@ -4844,7 +4845,7 @@
           <a:p>
             <a:fld id="{48A87A34-81AB-432B-8DAE-1953F412C126}" type="datetimeFigureOut">
               <a:rPr lang="en-US" dirty="0"/>
-              <a:t>2/25/24</a:t>
+              <a:t>3/8/24</a:t>
             </a:fld>
             <a:endParaRPr lang="en-US" dirty="0"/>
           </a:p>
@@ -5102,7 +5103,7 @@
           <a:p>
             <a:fld id="{48A87A34-81AB-432B-8DAE-1953F412C126}" type="datetimeFigureOut">
               <a:rPr lang="en-US" dirty="0"/>
-              <a:t>2/25/24</a:t>
+              <a:t>3/8/24</a:t>
             </a:fld>
             <a:endParaRPr lang="en-US" dirty="0"/>
           </a:p>
@@ -5531,7 +5532,7 @@
           <a:p>
             <a:fld id="{48A87A34-81AB-432B-8DAE-1953F412C126}" type="datetimeFigureOut">
               <a:rPr lang="en-US" dirty="0"/>
-              <a:t>2/25/24</a:t>
+              <a:t>3/8/24</a:t>
             </a:fld>
             <a:endParaRPr lang="en-US" dirty="0"/>
           </a:p>
@@ -6072,7 +6073,7 @@
           <a:p>
             <a:fld id="{48A87A34-81AB-432B-8DAE-1953F412C126}" type="datetimeFigureOut">
               <a:rPr lang="en-US" dirty="0"/>
-              <a:t>2/25/24</a:t>
+              <a:t>3/8/24</a:t>
             </a:fld>
             <a:endParaRPr lang="en-US" dirty="0"/>
           </a:p>
@@ -6787,7 +6788,7 @@
           <a:p>
             <a:fld id="{48A87A34-81AB-432B-8DAE-1953F412C126}" type="datetimeFigureOut">
               <a:rPr lang="en-US" dirty="0"/>
-              <a:t>2/25/24</a:t>
+              <a:t>3/8/24</a:t>
             </a:fld>
             <a:endParaRPr lang="en-US" dirty="0"/>
           </a:p>
@@ -6952,7 +6953,7 @@
           <a:p>
             <a:fld id="{48A87A34-81AB-432B-8DAE-1953F412C126}" type="datetimeFigureOut">
               <a:rPr lang="en-US" dirty="0"/>
-              <a:t>2/25/24</a:t>
+              <a:t>3/8/24</a:t>
             </a:fld>
             <a:endParaRPr lang="en-US" dirty="0"/>
           </a:p>
@@ -7127,7 +7128,7 @@
           <a:p>
             <a:fld id="{48A87A34-81AB-432B-8DAE-1953F412C126}" type="datetimeFigureOut">
               <a:rPr lang="en-US" dirty="0"/>
-              <a:t>2/25/24</a:t>
+              <a:t>3/8/24</a:t>
             </a:fld>
             <a:endParaRPr lang="en-US" dirty="0"/>
           </a:p>
@@ -7292,7 +7293,7 @@
           <a:p>
             <a:fld id="{48A87A34-81AB-432B-8DAE-1953F412C126}" type="datetimeFigureOut">
               <a:rPr lang="en-US" dirty="0"/>
-              <a:t>2/25/24</a:t>
+              <a:t>3/8/24</a:t>
             </a:fld>
             <a:endParaRPr lang="en-US" dirty="0"/>
           </a:p>
@@ -7537,7 +7538,7 @@
           <a:p>
             <a:fld id="{48A87A34-81AB-432B-8DAE-1953F412C126}" type="datetimeFigureOut">
               <a:rPr lang="en-US" dirty="0"/>
-              <a:t>2/25/24</a:t>
+              <a:t>3/8/24</a:t>
             </a:fld>
             <a:endParaRPr lang="en-US" dirty="0"/>
           </a:p>
@@ -7764,7 +7765,7 @@
           <a:p>
             <a:fld id="{48A87A34-81AB-432B-8DAE-1953F412C126}" type="datetimeFigureOut">
               <a:rPr lang="en-US" dirty="0"/>
-              <a:t>2/25/24</a:t>
+              <a:t>3/8/24</a:t>
             </a:fld>
             <a:endParaRPr lang="en-US" dirty="0"/>
           </a:p>
@@ -8140,7 +8141,7 @@
           <a:p>
             <a:fld id="{48A87A34-81AB-432B-8DAE-1953F412C126}" type="datetimeFigureOut">
               <a:rPr lang="en-US" dirty="0"/>
-              <a:t>2/25/24</a:t>
+              <a:t>3/8/24</a:t>
             </a:fld>
             <a:endParaRPr lang="en-US" dirty="0"/>
           </a:p>
@@ -8253,7 +8254,7 @@
           <a:p>
             <a:fld id="{48A87A34-81AB-432B-8DAE-1953F412C126}" type="datetimeFigureOut">
               <a:rPr lang="en-US" dirty="0"/>
-              <a:t>2/25/24</a:t>
+              <a:t>3/8/24</a:t>
             </a:fld>
             <a:endParaRPr lang="en-US" dirty="0"/>
           </a:p>
@@ -8343,7 +8344,7 @@
           <a:p>
             <a:fld id="{48A87A34-81AB-432B-8DAE-1953F412C126}" type="datetimeFigureOut">
               <a:rPr lang="en-US" dirty="0"/>
-              <a:t>2/25/24</a:t>
+              <a:t>3/8/24</a:t>
             </a:fld>
             <a:endParaRPr lang="en-US" dirty="0"/>
           </a:p>
@@ -8587,7 +8588,7 @@
           <a:p>
             <a:fld id="{48A87A34-81AB-432B-8DAE-1953F412C126}" type="datetimeFigureOut">
               <a:rPr lang="en-US" dirty="0"/>
-              <a:t>2/25/24</a:t>
+              <a:t>3/8/24</a:t>
             </a:fld>
             <a:endParaRPr lang="en-US" dirty="0"/>
           </a:p>
@@ -8862,7 +8863,7 @@
           <a:p>
             <a:fld id="{48A87A34-81AB-432B-8DAE-1953F412C126}" type="datetimeFigureOut">
               <a:rPr lang="en-US" dirty="0"/>
-              <a:t>2/25/24</a:t>
+              <a:t>3/8/24</a:t>
             </a:fld>
             <a:endParaRPr lang="en-US" dirty="0"/>
           </a:p>
@@ -11935,7 +11936,7 @@
             <a:fld id="{48A87A34-81AB-432B-8DAE-1953F412C126}" type="datetimeFigureOut">
               <a:rPr lang="en-US" dirty="0"/>
               <a:pPr/>
-              <a:t>2/25/24</a:t>
+              <a:t>3/8/24</a:t>
             </a:fld>
             <a:endParaRPr lang="en-US" dirty="0"/>
           </a:p>
@@ -12666,6 +12667,134 @@
           <p:cNvPr id="2" name="Title 1">
             <a:extLst>
               <a:ext uri="{FF2B5EF4-FFF2-40B4-BE49-F238E27FC236}">
+                <a16:creationId xmlns:a16="http://schemas.microsoft.com/office/drawing/2014/main" id="{8F5E3F04-F0F8-50E9-36FC-BE2F6BB63D1B}"/>
+              </a:ext>
+            </a:extLst>
+          </p:cNvPr>
+          <p:cNvSpPr>
+            <a:spLocks noGrp="1"/>
+          </p:cNvSpPr>
+          <p:nvPr>
+            <p:ph type="title"/>
+          </p:nvPr>
+        </p:nvSpPr>
+        <p:spPr/>
+        <p:txBody>
+          <a:bodyPr/>
+          <a:lstStyle/>
+          <a:p>
+            <a:r>
+              <a:rPr lang="en-BY" dirty="0"/>
+              <a:t>PROMQL</a:t>
+            </a:r>
+          </a:p>
+        </p:txBody>
+      </p:sp>
+      <p:sp>
+        <p:nvSpPr>
+          <p:cNvPr id="3" name="Content Placeholder 2">
+            <a:extLst>
+              <a:ext uri="{FF2B5EF4-FFF2-40B4-BE49-F238E27FC236}">
+                <a16:creationId xmlns:a16="http://schemas.microsoft.com/office/drawing/2014/main" id="{0B4460C0-F945-E953-BA65-341D6146EF33}"/>
+              </a:ext>
+            </a:extLst>
+          </p:cNvPr>
+          <p:cNvSpPr>
+            <a:spLocks noGrp="1"/>
+          </p:cNvSpPr>
+          <p:nvPr>
+            <p:ph idx="1"/>
+          </p:nvPr>
+        </p:nvSpPr>
+        <p:spPr/>
+        <p:txBody>
+          <a:bodyPr/>
+          <a:lstStyle/>
+          <a:p>
+            <a:pPr marL="0" indent="0">
+              <a:buNone/>
+            </a:pPr>
+            <a:r>
+              <a:rPr lang="en-BY" dirty="0"/>
+              <a:t>Metric types:</a:t>
+            </a:r>
+          </a:p>
+          <a:p>
+            <a:pPr marL="0" indent="0">
+              <a:buNone/>
+            </a:pPr>
+            <a:endParaRPr lang="en-BY" dirty="0"/>
+          </a:p>
+        </p:txBody>
+      </p:sp>
+      <p:pic>
+        <p:nvPicPr>
+          <p:cNvPr id="5" name="Picture 4">
+            <a:extLst>
+              <a:ext uri="{FF2B5EF4-FFF2-40B4-BE49-F238E27FC236}">
+                <a16:creationId xmlns:a16="http://schemas.microsoft.com/office/drawing/2014/main" id="{DD972B1D-BB0A-2506-FDBC-8C383AB746BE}"/>
+              </a:ext>
+              <a:ext uri="{C183D7F6-B498-43B3-948B-1728B52AA6E4}">
+                <adec:decorative xmlns:adec="http://schemas.microsoft.com/office/drawing/2017/decorative" val="0"/>
+              </a:ext>
+            </a:extLst>
+          </p:cNvPr>
+          <p:cNvPicPr>
+            <a:picLocks noChangeAspect="1"/>
+          </p:cNvPicPr>
+          <p:nvPr/>
+        </p:nvPicPr>
+        <p:blipFill>
+          <a:blip r:embed="rId2"/>
+          <a:stretch>
+            <a:fillRect/>
+          </a:stretch>
+        </p:blipFill>
+        <p:spPr>
+          <a:xfrm>
+            <a:off x="2328914" y="2972713"/>
+            <a:ext cx="7534171" cy="3266769"/>
+          </a:xfrm>
+          <a:prstGeom prst="rect">
+            <a:avLst/>
+          </a:prstGeom>
+        </p:spPr>
+      </p:pic>
+    </p:spTree>
+    <p:extLst>
+      <p:ext uri="{BB962C8B-B14F-4D97-AF65-F5344CB8AC3E}">
+        <p14:creationId xmlns:p14="http://schemas.microsoft.com/office/powerpoint/2010/main" val="554424280"/>
+      </p:ext>
+    </p:extLst>
+  </p:cSld>
+  <p:clrMapOvr>
+    <a:masterClrMapping/>
+  </p:clrMapOvr>
+</p:sld>
+</file>
+
+<file path=ppt/slides/slide5.xml><?xml version="1.0" encoding="utf-8"?>
+<p:sld xmlns:a="http://schemas.openxmlformats.org/drawingml/2006/main" xmlns:r="http://schemas.openxmlformats.org/officeDocument/2006/relationships" xmlns:p="http://schemas.openxmlformats.org/presentationml/2006/main">
+  <p:cSld>
+    <p:spTree>
+      <p:nvGrpSpPr>
+        <p:cNvPr id="1" name=""/>
+        <p:cNvGrpSpPr/>
+        <p:nvPr/>
+      </p:nvGrpSpPr>
+      <p:grpSpPr>
+        <a:xfrm>
+          <a:off x="0" y="0"/>
+          <a:ext cx="0" cy="0"/>
+          <a:chOff x="0" y="0"/>
+          <a:chExt cx="0" cy="0"/>
+        </a:xfrm>
+      </p:grpSpPr>
+      <p:sp>
+        <p:nvSpPr>
+          <p:cNvPr id="2" name="Title 1">
+            <a:extLst>
+              <a:ext uri="{FF2B5EF4-FFF2-40B4-BE49-F238E27FC236}">
                 <a16:creationId xmlns:a16="http://schemas.microsoft.com/office/drawing/2014/main" id="{56DB794D-0FE7-22FC-AD44-9A53CAD10F7B}"/>
               </a:ext>
             </a:extLst>
@@ -12713,7 +12842,7 @@
         </p:spPr>
         <p:txBody>
           <a:bodyPr>
-            <a:normAutofit fontScale="92500" lnSpcReduction="20000"/>
+            <a:normAutofit fontScale="77500" lnSpcReduction="20000"/>
           </a:bodyPr>
           <a:lstStyle/>
           <a:p>
@@ -12743,17 +12872,7 @@
                 <a:effectLst/>
                 <a:hlinkClick r:id="rId3"/>
               </a:rPr>
-              <a:t>kube-prometheus</a:t>
-            </a:r>
-            <a:r>
-              <a:rPr lang="en-GB">
-                <a:solidFill>
-                  <a:srgbClr val="287BDE"/>
-                </a:solidFill>
-                <a:effectLst/>
-                <a:hlinkClick r:id="rId3"/>
-              </a:rPr>
-              <a:t>-stack default config</a:t>
+              <a:t>kube-prometheus-stack default config</a:t>
             </a:r>
             <a:endParaRPr lang="en-GB" dirty="0">
               <a:solidFill>
@@ -12845,9 +12964,60 @@
               <a:buNone/>
             </a:pPr>
             <a:r>
-              <a:rPr lang="en-BY" dirty="0"/>
-              <a:t>TODO:</a:t>
+              <a:rPr lang="en-GB" dirty="0"/>
+              <a:t>https://</a:t>
             </a:r>
+            <a:r>
+              <a:rPr lang="en-GB" dirty="0" err="1"/>
+              <a:t>github.com</a:t>
+            </a:r>
+            <a:r>
+              <a:rPr lang="en-GB" dirty="0"/>
+              <a:t>/</a:t>
+            </a:r>
+            <a:r>
+              <a:rPr lang="en-GB" dirty="0" err="1"/>
+              <a:t>ybaryshnikova</a:t>
+            </a:r>
+            <a:r>
+              <a:rPr lang="en-GB"/>
+              <a:t>/monitoring-meetup</a:t>
+            </a:r>
+            <a:endParaRPr lang="en-BY" dirty="0"/>
+          </a:p>
+          <a:p>
+            <a:pPr marL="0" indent="0">
+              <a:buNone/>
+            </a:pPr>
+            <a:r>
+              <a:rPr lang="en-GB" dirty="0"/>
+              <a:t>https://</a:t>
+            </a:r>
+            <a:r>
+              <a:rPr lang="en-GB" dirty="0" err="1"/>
+              <a:t>github.com</a:t>
+            </a:r>
+            <a:r>
+              <a:rPr lang="en-GB" dirty="0"/>
+              <a:t>/</a:t>
+            </a:r>
+            <a:r>
+              <a:rPr lang="en-GB" dirty="0" err="1"/>
+              <a:t>ybaryshnikova</a:t>
+            </a:r>
+            <a:r>
+              <a:rPr lang="en-GB" dirty="0"/>
+              <a:t>/</a:t>
+            </a:r>
+            <a:r>
+              <a:rPr lang="en-GB" dirty="0" err="1"/>
+              <a:t>prometheus</a:t>
+            </a:r>
+            <a:r>
+              <a:rPr lang="en-GB" dirty="0"/>
+              <a:t>-metrics-example</a:t>
+            </a:r>
+            <a:endParaRPr lang="en-BY" dirty="0"/>
           </a:p>
         </p:txBody>
       </p:sp>

</xml_diff>